<commit_message>
Modified colors of the map
</commit_message>
<xml_diff>
--- a/MP1/SVG maps/library.pptx
+++ b/MP1/SVG maps/library.pptx
@@ -115,7 +115,7 @@
   </p:defaultTextStyle>
   <p:extLst>
     <p:ext uri="{EFAFB233-063F-42B5-8137-9DF3F51BA10A}">
-      <p15:sldGuideLst xmlns="" xmlns:p15="http://schemas.microsoft.com/office/powerpoint/2012/main">
+      <p15:sldGuideLst xmlns:p15="http://schemas.microsoft.com/office/powerpoint/2012/main">
         <p15:guide id="1" orient="horz" pos="4310">
           <p15:clr>
             <a:srgbClr val="A4A3A4"/>
@@ -129,7 +129,7 @@
       </p15:sldGuideLst>
     </p:ext>
     <p:ext uri="{2D200454-40CA-4A62-9FC3-DE9A4176ACB9}">
-      <p15:notesGuideLst xmlns="" xmlns:p15="http://schemas.microsoft.com/office/powerpoint/2012/main">
+      <p15:notesGuideLst xmlns:p15="http://schemas.microsoft.com/office/powerpoint/2012/main">
         <p15:guide id="1" orient="horz" pos="2880">
           <p15:clr>
             <a:srgbClr val="A4A3A4"/>
@@ -228,7 +228,7 @@
           <a:p>
             <a:fld id="{0EEB80C7-568E-4336-8748-0853E0112BA8}" type="datetimeFigureOut">
               <a:rPr lang="en-PH" smtClean="0"/>
-              <a:t>30/03/2017</a:t>
+              <a:t>31/03/2017</a:t>
             </a:fld>
             <a:endParaRPr lang="en-PH"/>
           </a:p>
@@ -393,7 +393,7 @@
           <a:p>
             <a:fld id="{6270E0D2-8F04-444F-8DD2-70DC9D5820D7}" type="datetimeFigureOut">
               <a:rPr lang="en-US" smtClean="0"/>
-              <a:t>3/30/2017</a:t>
+              <a:t>3/31/2017</a:t>
             </a:fld>
             <a:endParaRPr lang="en-US"/>
           </a:p>
@@ -975,7 +975,7 @@
           <a:p>
             <a:fld id="{3AA74B47-8083-4345-865C-BA7499E5DF64}" type="datetimeFigureOut">
               <a:rPr lang="en-PH" smtClean="0"/>
-              <a:t>30/03/2017</a:t>
+              <a:t>31/03/2017</a:t>
             </a:fld>
             <a:endParaRPr lang="en-PH"/>
           </a:p>
@@ -4998,7 +4998,7 @@
           <a:p>
             <a:fld id="{3AA74B47-8083-4345-865C-BA7499E5DF64}" type="datetimeFigureOut">
               <a:rPr lang="en-PH" smtClean="0"/>
-              <a:t>30/03/2017</a:t>
+              <a:t>31/03/2017</a:t>
             </a:fld>
             <a:endParaRPr lang="en-PH"/>
           </a:p>
@@ -5244,7 +5244,7 @@
           <a:p>
             <a:fld id="{3AA74B47-8083-4345-865C-BA7499E5DF64}" type="datetimeFigureOut">
               <a:rPr lang="en-PH" smtClean="0"/>
-              <a:t>30/03/2017</a:t>
+              <a:t>31/03/2017</a:t>
             </a:fld>
             <a:endParaRPr lang="en-PH"/>
           </a:p>
@@ -5532,7 +5532,7 @@
           <a:p>
             <a:fld id="{3AA74B47-8083-4345-865C-BA7499E5DF64}" type="datetimeFigureOut">
               <a:rPr lang="en-PH" smtClean="0"/>
-              <a:t>30/03/2017</a:t>
+              <a:t>31/03/2017</a:t>
             </a:fld>
             <a:endParaRPr lang="en-PH"/>
           </a:p>
@@ -5959,7 +5959,7 @@
           <a:p>
             <a:fld id="{3AA74B47-8083-4345-865C-BA7499E5DF64}" type="datetimeFigureOut">
               <a:rPr lang="en-PH" smtClean="0"/>
-              <a:t>30/03/2017</a:t>
+              <a:t>31/03/2017</a:t>
             </a:fld>
             <a:endParaRPr lang="en-PH"/>
           </a:p>
@@ -6077,7 +6077,7 @@
           <a:p>
             <a:fld id="{3AA74B47-8083-4345-865C-BA7499E5DF64}" type="datetimeFigureOut">
               <a:rPr lang="en-PH" smtClean="0"/>
-              <a:t>30/03/2017</a:t>
+              <a:t>31/03/2017</a:t>
             </a:fld>
             <a:endParaRPr lang="en-PH"/>
           </a:p>
@@ -6172,7 +6172,7 @@
           <a:p>
             <a:fld id="{3AA74B47-8083-4345-865C-BA7499E5DF64}" type="datetimeFigureOut">
               <a:rPr lang="en-PH" smtClean="0"/>
-              <a:t>30/03/2017</a:t>
+              <a:t>31/03/2017</a:t>
             </a:fld>
             <a:endParaRPr lang="en-PH"/>
           </a:p>
@@ -6449,7 +6449,7 @@
           <a:p>
             <a:fld id="{3AA74B47-8083-4345-865C-BA7499E5DF64}" type="datetimeFigureOut">
               <a:rPr lang="en-PH" smtClean="0"/>
-              <a:t>30/03/2017</a:t>
+              <a:t>31/03/2017</a:t>
             </a:fld>
             <a:endParaRPr lang="en-PH"/>
           </a:p>
@@ -6702,7 +6702,7 @@
           <a:p>
             <a:fld id="{3AA74B47-8083-4345-865C-BA7499E5DF64}" type="datetimeFigureOut">
               <a:rPr lang="en-PH" smtClean="0"/>
-              <a:t>30/03/2017</a:t>
+              <a:t>31/03/2017</a:t>
             </a:fld>
             <a:endParaRPr lang="en-PH"/>
           </a:p>
@@ -6915,7 +6915,7 @@
           <a:p>
             <a:fld id="{3AA74B47-8083-4345-865C-BA7499E5DF64}" type="datetimeFigureOut">
               <a:rPr lang="en-PH" smtClean="0"/>
-              <a:t>30/03/2017</a:t>
+              <a:t>31/03/2017</a:t>
             </a:fld>
             <a:endParaRPr lang="en-PH"/>
           </a:p>
@@ -7344,8 +7344,8 @@
         </p:nvGrpSpPr>
         <p:grpSpPr>
           <a:xfrm>
-            <a:off x="12817724" y="1583953"/>
-            <a:ext cx="634254" cy="630936"/>
+            <a:off x="12702366" y="2850526"/>
+            <a:ext cx="914400" cy="914400"/>
             <a:chOff x="25275108" y="1009135"/>
             <a:chExt cx="634254" cy="4248000"/>
           </a:xfrm>
@@ -7439,8 +7439,8 @@
         </p:nvSpPr>
         <p:spPr>
           <a:xfrm>
-            <a:off x="12601700" y="827435"/>
-            <a:ext cx="6408712" cy="707886"/>
+            <a:off x="13720608" y="2985299"/>
+            <a:ext cx="6408712" cy="830997"/>
           </a:xfrm>
           <a:prstGeom prst="rect">
             <a:avLst/>
@@ -7454,16 +7454,857 @@
           <a:lstStyle/>
           <a:p>
             <a:r>
-              <a:rPr lang="en-US" sz="4000" dirty="0" smtClean="0">
+              <a:rPr lang="en-US" sz="4800" dirty="0" smtClean="0">
                 <a:solidFill>
-                  <a:srgbClr val="FF0000"/>
+                  <a:schemeClr val="tx1">
+                    <a:lumMod val="95000"/>
+                    <a:lumOff val="5000"/>
+                  </a:schemeClr>
                 </a:solidFill>
               </a:rPr>
               <a:t>Book Shelves</a:t>
             </a:r>
-            <a:endParaRPr lang="en-US" sz="4000" dirty="0">
+            <a:endParaRPr lang="en-US" sz="4800" dirty="0">
               <a:solidFill>
-                <a:srgbClr val="FF0000"/>
+                <a:schemeClr val="tx1">
+                  <a:lumMod val="95000"/>
+                  <a:lumOff val="5000"/>
+                </a:schemeClr>
+              </a:solidFill>
+            </a:endParaRPr>
+          </a:p>
+        </p:txBody>
+      </p:sp>
+      <p:sp>
+        <p:nvSpPr>
+          <p:cNvPr id="7" name="Rectangle 6"/>
+          <p:cNvSpPr/>
+          <p:nvPr/>
+        </p:nvSpPr>
+        <p:spPr>
+          <a:xfrm>
+            <a:off x="12702366" y="4020268"/>
+            <a:ext cx="914400" cy="914400"/>
+          </a:xfrm>
+          <a:prstGeom prst="rect">
+            <a:avLst/>
+          </a:prstGeom>
+          <a:solidFill>
+            <a:srgbClr val="F8FC42"/>
+          </a:solidFill>
+          <a:ln w="76200"/>
+        </p:spPr>
+        <p:style>
+          <a:lnRef idx="2">
+            <a:schemeClr val="accent1">
+              <a:shade val="50000"/>
+            </a:schemeClr>
+          </a:lnRef>
+          <a:fillRef idx="1">
+            <a:schemeClr val="accent1"/>
+          </a:fillRef>
+          <a:effectRef idx="0">
+            <a:schemeClr val="accent1"/>
+          </a:effectRef>
+          <a:fontRef idx="minor">
+            <a:schemeClr val="lt1"/>
+          </a:fontRef>
+        </p:style>
+        <p:txBody>
+          <a:bodyPr rtlCol="0" anchor="ctr"/>
+          <a:lstStyle/>
+          <a:p>
+            <a:pPr algn="ctr"/>
+            <a:endParaRPr lang="en-PH"/>
+          </a:p>
+        </p:txBody>
+      </p:sp>
+      <p:sp>
+        <p:nvSpPr>
+          <p:cNvPr id="11" name="TextBox 10"/>
+          <p:cNvSpPr txBox="1"/>
+          <p:nvPr/>
+        </p:nvSpPr>
+        <p:spPr>
+          <a:xfrm>
+            <a:off x="13720608" y="4112275"/>
+            <a:ext cx="7480428" cy="830997"/>
+          </a:xfrm>
+          <a:prstGeom prst="rect">
+            <a:avLst/>
+          </a:prstGeom>
+          <a:noFill/>
+        </p:spPr>
+        <p:txBody>
+          <a:bodyPr wrap="square" rtlCol="0">
+            <a:spAutoFit/>
+          </a:bodyPr>
+          <a:lstStyle/>
+          <a:p>
+            <a:r>
+              <a:rPr lang="en-US" sz="4800" dirty="0" smtClean="0">
+                <a:solidFill>
+                  <a:schemeClr val="tx1">
+                    <a:lumMod val="95000"/>
+                    <a:lumOff val="5000"/>
+                  </a:schemeClr>
+                </a:solidFill>
+              </a:rPr>
+              <a:t>Authorized Area /Staff Area</a:t>
+            </a:r>
+            <a:endParaRPr lang="en-US" sz="4800" dirty="0">
+              <a:solidFill>
+                <a:schemeClr val="tx1">
+                  <a:lumMod val="95000"/>
+                  <a:lumOff val="5000"/>
+                </a:schemeClr>
+              </a:solidFill>
+            </a:endParaRPr>
+          </a:p>
+        </p:txBody>
+      </p:sp>
+      <p:sp>
+        <p:nvSpPr>
+          <p:cNvPr id="12" name="Rectangle 11"/>
+          <p:cNvSpPr/>
+          <p:nvPr/>
+        </p:nvSpPr>
+        <p:spPr>
+          <a:xfrm>
+            <a:off x="12702366" y="5252860"/>
+            <a:ext cx="914400" cy="914400"/>
+          </a:xfrm>
+          <a:prstGeom prst="rect">
+            <a:avLst/>
+          </a:prstGeom>
+          <a:solidFill>
+            <a:srgbClr val="00B0F0"/>
+          </a:solidFill>
+          <a:ln w="76200"/>
+        </p:spPr>
+        <p:style>
+          <a:lnRef idx="2">
+            <a:schemeClr val="accent1">
+              <a:shade val="50000"/>
+            </a:schemeClr>
+          </a:lnRef>
+          <a:fillRef idx="1">
+            <a:schemeClr val="accent1"/>
+          </a:fillRef>
+          <a:effectRef idx="0">
+            <a:schemeClr val="accent1"/>
+          </a:effectRef>
+          <a:fontRef idx="minor">
+            <a:schemeClr val="lt1"/>
+          </a:fontRef>
+        </p:style>
+        <p:txBody>
+          <a:bodyPr rtlCol="0" anchor="ctr"/>
+          <a:lstStyle/>
+          <a:p>
+            <a:pPr algn="ctr"/>
+            <a:endParaRPr lang="en-PH"/>
+          </a:p>
+        </p:txBody>
+      </p:sp>
+      <p:sp>
+        <p:nvSpPr>
+          <p:cNvPr id="13" name="TextBox 12"/>
+          <p:cNvSpPr txBox="1"/>
+          <p:nvPr/>
+        </p:nvSpPr>
+        <p:spPr>
+          <a:xfrm>
+            <a:off x="13753828" y="5328369"/>
+            <a:ext cx="6408712" cy="830997"/>
+          </a:xfrm>
+          <a:prstGeom prst="rect">
+            <a:avLst/>
+          </a:prstGeom>
+          <a:noFill/>
+        </p:spPr>
+        <p:txBody>
+          <a:bodyPr wrap="square" rtlCol="0">
+            <a:spAutoFit/>
+          </a:bodyPr>
+          <a:lstStyle/>
+          <a:p>
+            <a:r>
+              <a:rPr lang="en-US" sz="4800" dirty="0" smtClean="0">
+                <a:solidFill>
+                  <a:schemeClr val="tx1">
+                    <a:lumMod val="95000"/>
+                    <a:lumOff val="5000"/>
+                  </a:schemeClr>
+                </a:solidFill>
+              </a:rPr>
+              <a:t>Baggage Counter</a:t>
+            </a:r>
+            <a:endParaRPr lang="en-US" sz="4800" dirty="0">
+              <a:solidFill>
+                <a:schemeClr val="tx1">
+                  <a:lumMod val="95000"/>
+                  <a:lumOff val="5000"/>
+                </a:schemeClr>
+              </a:solidFill>
+            </a:endParaRPr>
+          </a:p>
+        </p:txBody>
+      </p:sp>
+      <p:sp>
+        <p:nvSpPr>
+          <p:cNvPr id="14" name="Rectangle 13"/>
+          <p:cNvSpPr/>
+          <p:nvPr/>
+        </p:nvSpPr>
+        <p:spPr>
+          <a:xfrm>
+            <a:off x="12712275" y="6422508"/>
+            <a:ext cx="914400" cy="914400"/>
+          </a:xfrm>
+          <a:prstGeom prst="rect">
+            <a:avLst/>
+          </a:prstGeom>
+        </p:spPr>
+        <p:style>
+          <a:lnRef idx="2">
+            <a:schemeClr val="accent2">
+              <a:shade val="50000"/>
+            </a:schemeClr>
+          </a:lnRef>
+          <a:fillRef idx="1">
+            <a:schemeClr val="accent2"/>
+          </a:fillRef>
+          <a:effectRef idx="0">
+            <a:schemeClr val="accent2"/>
+          </a:effectRef>
+          <a:fontRef idx="minor">
+            <a:schemeClr val="lt1"/>
+          </a:fontRef>
+        </p:style>
+        <p:txBody>
+          <a:bodyPr rtlCol="0" anchor="ctr"/>
+          <a:lstStyle/>
+          <a:p>
+            <a:pPr algn="ctr"/>
+            <a:endParaRPr lang="en-PH"/>
+          </a:p>
+        </p:txBody>
+      </p:sp>
+      <p:sp>
+        <p:nvSpPr>
+          <p:cNvPr id="15" name="TextBox 14"/>
+          <p:cNvSpPr txBox="1"/>
+          <p:nvPr/>
+        </p:nvSpPr>
+        <p:spPr>
+          <a:xfrm>
+            <a:off x="13753828" y="6355055"/>
+            <a:ext cx="6408712" cy="830997"/>
+          </a:xfrm>
+          <a:prstGeom prst="rect">
+            <a:avLst/>
+          </a:prstGeom>
+          <a:noFill/>
+        </p:spPr>
+        <p:txBody>
+          <a:bodyPr wrap="square" rtlCol="0">
+            <a:spAutoFit/>
+          </a:bodyPr>
+          <a:lstStyle/>
+          <a:p>
+            <a:r>
+              <a:rPr lang="en-US" sz="4800" dirty="0" smtClean="0">
+                <a:solidFill>
+                  <a:schemeClr val="tx1">
+                    <a:lumMod val="95000"/>
+                    <a:lumOff val="5000"/>
+                  </a:schemeClr>
+                </a:solidFill>
+              </a:rPr>
+              <a:t>Men’s CR</a:t>
+            </a:r>
+            <a:endParaRPr lang="en-US" sz="4800" dirty="0">
+              <a:solidFill>
+                <a:schemeClr val="tx1">
+                  <a:lumMod val="95000"/>
+                  <a:lumOff val="5000"/>
+                </a:schemeClr>
+              </a:solidFill>
+            </a:endParaRPr>
+          </a:p>
+        </p:txBody>
+      </p:sp>
+      <p:sp>
+        <p:nvSpPr>
+          <p:cNvPr id="16" name="Rectangle 15"/>
+          <p:cNvSpPr/>
+          <p:nvPr/>
+        </p:nvSpPr>
+        <p:spPr>
+          <a:xfrm>
+            <a:off x="12712275" y="7655100"/>
+            <a:ext cx="912656" cy="914400"/>
+          </a:xfrm>
+          <a:prstGeom prst="rect">
+            <a:avLst/>
+          </a:prstGeom>
+        </p:spPr>
+        <p:style>
+          <a:lnRef idx="2">
+            <a:schemeClr val="accent6">
+              <a:shade val="50000"/>
+            </a:schemeClr>
+          </a:lnRef>
+          <a:fillRef idx="1">
+            <a:schemeClr val="accent6"/>
+          </a:fillRef>
+          <a:effectRef idx="0">
+            <a:schemeClr val="accent6"/>
+          </a:effectRef>
+          <a:fontRef idx="minor">
+            <a:schemeClr val="lt1"/>
+          </a:fontRef>
+        </p:style>
+        <p:txBody>
+          <a:bodyPr rtlCol="0" anchor="ctr"/>
+          <a:lstStyle/>
+          <a:p>
+            <a:pPr algn="ctr"/>
+            <a:endParaRPr lang="en-PH"/>
+          </a:p>
+        </p:txBody>
+      </p:sp>
+      <p:sp>
+        <p:nvSpPr>
+          <p:cNvPr id="17" name="TextBox 16"/>
+          <p:cNvSpPr txBox="1"/>
+          <p:nvPr/>
+        </p:nvSpPr>
+        <p:spPr>
+          <a:xfrm>
+            <a:off x="13753828" y="7694570"/>
+            <a:ext cx="6408712" cy="830997"/>
+          </a:xfrm>
+          <a:prstGeom prst="rect">
+            <a:avLst/>
+          </a:prstGeom>
+          <a:noFill/>
+        </p:spPr>
+        <p:txBody>
+          <a:bodyPr wrap="square" rtlCol="0">
+            <a:spAutoFit/>
+          </a:bodyPr>
+          <a:lstStyle/>
+          <a:p>
+            <a:r>
+              <a:rPr lang="en-US" sz="4800" dirty="0" smtClean="0">
+                <a:solidFill>
+                  <a:schemeClr val="tx1">
+                    <a:lumMod val="95000"/>
+                    <a:lumOff val="5000"/>
+                  </a:schemeClr>
+                </a:solidFill>
+              </a:rPr>
+              <a:t>Women’s CR</a:t>
+            </a:r>
+            <a:endParaRPr lang="en-US" sz="4800" dirty="0">
+              <a:solidFill>
+                <a:schemeClr val="tx1">
+                  <a:lumMod val="95000"/>
+                  <a:lumOff val="5000"/>
+                </a:schemeClr>
+              </a:solidFill>
+            </a:endParaRPr>
+          </a:p>
+        </p:txBody>
+      </p:sp>
+      <p:grpSp>
+        <p:nvGrpSpPr>
+          <p:cNvPr id="18" name="Group 17"/>
+          <p:cNvGrpSpPr/>
+          <p:nvPr/>
+        </p:nvGrpSpPr>
+        <p:grpSpPr>
+          <a:xfrm>
+            <a:off x="12710531" y="9010230"/>
+            <a:ext cx="914400" cy="914400"/>
+            <a:chOff x="17650644" y="6552505"/>
+            <a:chExt cx="1935832" cy="942142"/>
+          </a:xfrm>
+          <a:solidFill>
+            <a:schemeClr val="accent2">
+              <a:lumMod val="40000"/>
+              <a:lumOff val="60000"/>
+            </a:schemeClr>
+          </a:solidFill>
+        </p:grpSpPr>
+        <p:sp>
+          <p:nvSpPr>
+            <p:cNvPr id="19" name="Rectangle 18"/>
+            <p:cNvSpPr/>
+            <p:nvPr/>
+          </p:nvSpPr>
+          <p:spPr>
+            <a:xfrm>
+              <a:off x="17650644" y="6552505"/>
+              <a:ext cx="1935832" cy="936104"/>
+            </a:xfrm>
+            <a:prstGeom prst="rect">
+              <a:avLst/>
+            </a:prstGeom>
+            <a:grpFill/>
+            <a:ln w="76200"/>
+          </p:spPr>
+          <p:style>
+            <a:lnRef idx="2">
+              <a:schemeClr val="accent1">
+                <a:shade val="50000"/>
+              </a:schemeClr>
+            </a:lnRef>
+            <a:fillRef idx="1">
+              <a:schemeClr val="accent1"/>
+            </a:fillRef>
+            <a:effectRef idx="0">
+              <a:schemeClr val="accent1"/>
+            </a:effectRef>
+            <a:fontRef idx="minor">
+              <a:schemeClr val="lt1"/>
+            </a:fontRef>
+          </p:style>
+          <p:txBody>
+            <a:bodyPr rtlCol="0" anchor="ctr"/>
+            <a:lstStyle/>
+            <a:p>
+              <a:pPr algn="ctr"/>
+              <a:endParaRPr lang="en-PH"/>
+            </a:p>
+          </p:txBody>
+        </p:sp>
+        <p:cxnSp>
+          <p:nvCxnSpPr>
+            <p:cNvPr id="20" name="Straight Connector 19"/>
+            <p:cNvCxnSpPr/>
+            <p:nvPr/>
+          </p:nvCxnSpPr>
+          <p:spPr>
+            <a:xfrm>
+              <a:off x="17930292" y="6552505"/>
+              <a:ext cx="0" cy="936104"/>
+            </a:xfrm>
+            <a:prstGeom prst="line">
+              <a:avLst/>
+            </a:prstGeom>
+            <a:grpFill/>
+            <a:ln w="76200">
+              <a:solidFill>
+                <a:schemeClr val="tx2">
+                  <a:lumMod val="75000"/>
+                </a:schemeClr>
+              </a:solidFill>
+            </a:ln>
+          </p:spPr>
+          <p:style>
+            <a:lnRef idx="1">
+              <a:schemeClr val="accent1"/>
+            </a:lnRef>
+            <a:fillRef idx="0">
+              <a:schemeClr val="accent1"/>
+            </a:fillRef>
+            <a:effectRef idx="0">
+              <a:schemeClr val="accent1"/>
+            </a:effectRef>
+            <a:fontRef idx="minor">
+              <a:schemeClr val="tx1"/>
+            </a:fontRef>
+          </p:style>
+        </p:cxnSp>
+        <p:cxnSp>
+          <p:nvCxnSpPr>
+            <p:cNvPr id="21" name="Straight Connector 20"/>
+            <p:cNvCxnSpPr/>
+            <p:nvPr/>
+          </p:nvCxnSpPr>
+          <p:spPr>
+            <a:xfrm>
+              <a:off x="18146316" y="6552505"/>
+              <a:ext cx="0" cy="936104"/>
+            </a:xfrm>
+            <a:prstGeom prst="line">
+              <a:avLst/>
+            </a:prstGeom>
+            <a:grpFill/>
+            <a:ln w="76200">
+              <a:solidFill>
+                <a:schemeClr val="tx2">
+                  <a:lumMod val="75000"/>
+                </a:schemeClr>
+              </a:solidFill>
+            </a:ln>
+          </p:spPr>
+          <p:style>
+            <a:lnRef idx="1">
+              <a:schemeClr val="accent1"/>
+            </a:lnRef>
+            <a:fillRef idx="0">
+              <a:schemeClr val="accent1"/>
+            </a:fillRef>
+            <a:effectRef idx="0">
+              <a:schemeClr val="accent1"/>
+            </a:effectRef>
+            <a:fontRef idx="minor">
+              <a:schemeClr val="tx1"/>
+            </a:fontRef>
+          </p:style>
+        </p:cxnSp>
+        <p:cxnSp>
+          <p:nvCxnSpPr>
+            <p:cNvPr id="22" name="Straight Connector 21"/>
+            <p:cNvCxnSpPr/>
+            <p:nvPr/>
+          </p:nvCxnSpPr>
+          <p:spPr>
+            <a:xfrm>
+              <a:off x="18362340" y="6552505"/>
+              <a:ext cx="0" cy="936104"/>
+            </a:xfrm>
+            <a:prstGeom prst="line">
+              <a:avLst/>
+            </a:prstGeom>
+            <a:grpFill/>
+            <a:ln w="76200">
+              <a:solidFill>
+                <a:schemeClr val="tx2">
+                  <a:lumMod val="75000"/>
+                </a:schemeClr>
+              </a:solidFill>
+            </a:ln>
+          </p:spPr>
+          <p:style>
+            <a:lnRef idx="1">
+              <a:schemeClr val="accent1"/>
+            </a:lnRef>
+            <a:fillRef idx="0">
+              <a:schemeClr val="accent1"/>
+            </a:fillRef>
+            <a:effectRef idx="0">
+              <a:schemeClr val="accent1"/>
+            </a:effectRef>
+            <a:fontRef idx="minor">
+              <a:schemeClr val="tx1"/>
+            </a:fontRef>
+          </p:style>
+        </p:cxnSp>
+        <p:cxnSp>
+          <p:nvCxnSpPr>
+            <p:cNvPr id="23" name="Straight Connector 22"/>
+            <p:cNvCxnSpPr/>
+            <p:nvPr/>
+          </p:nvCxnSpPr>
+          <p:spPr>
+            <a:xfrm>
+              <a:off x="18618560" y="6552505"/>
+              <a:ext cx="0" cy="936104"/>
+            </a:xfrm>
+            <a:prstGeom prst="line">
+              <a:avLst/>
+            </a:prstGeom>
+            <a:grpFill/>
+            <a:ln w="76200">
+              <a:solidFill>
+                <a:schemeClr val="tx2">
+                  <a:lumMod val="75000"/>
+                </a:schemeClr>
+              </a:solidFill>
+            </a:ln>
+          </p:spPr>
+          <p:style>
+            <a:lnRef idx="1">
+              <a:schemeClr val="accent1"/>
+            </a:lnRef>
+            <a:fillRef idx="0">
+              <a:schemeClr val="accent1"/>
+            </a:fillRef>
+            <a:effectRef idx="0">
+              <a:schemeClr val="accent1"/>
+            </a:effectRef>
+            <a:fontRef idx="minor">
+              <a:schemeClr val="tx1"/>
+            </a:fontRef>
+          </p:style>
+        </p:cxnSp>
+        <p:cxnSp>
+          <p:nvCxnSpPr>
+            <p:cNvPr id="24" name="Straight Connector 23"/>
+            <p:cNvCxnSpPr/>
+            <p:nvPr/>
+          </p:nvCxnSpPr>
+          <p:spPr>
+            <a:xfrm>
+              <a:off x="18866396" y="6558543"/>
+              <a:ext cx="0" cy="936104"/>
+            </a:xfrm>
+            <a:prstGeom prst="line">
+              <a:avLst/>
+            </a:prstGeom>
+            <a:grpFill/>
+            <a:ln w="76200">
+              <a:solidFill>
+                <a:schemeClr val="tx2">
+                  <a:lumMod val="75000"/>
+                </a:schemeClr>
+              </a:solidFill>
+            </a:ln>
+          </p:spPr>
+          <p:style>
+            <a:lnRef idx="1">
+              <a:schemeClr val="accent1"/>
+            </a:lnRef>
+            <a:fillRef idx="0">
+              <a:schemeClr val="accent1"/>
+            </a:fillRef>
+            <a:effectRef idx="0">
+              <a:schemeClr val="accent1"/>
+            </a:effectRef>
+            <a:fontRef idx="minor">
+              <a:schemeClr val="tx1"/>
+            </a:fontRef>
+          </p:style>
+        </p:cxnSp>
+        <p:cxnSp>
+          <p:nvCxnSpPr>
+            <p:cNvPr id="25" name="Straight Connector 24"/>
+            <p:cNvCxnSpPr/>
+            <p:nvPr/>
+          </p:nvCxnSpPr>
+          <p:spPr>
+            <a:xfrm>
+              <a:off x="19154428" y="6552505"/>
+              <a:ext cx="0" cy="936104"/>
+            </a:xfrm>
+            <a:prstGeom prst="line">
+              <a:avLst/>
+            </a:prstGeom>
+            <a:grpFill/>
+            <a:ln w="76200">
+              <a:solidFill>
+                <a:schemeClr val="tx2">
+                  <a:lumMod val="75000"/>
+                </a:schemeClr>
+              </a:solidFill>
+            </a:ln>
+          </p:spPr>
+          <p:style>
+            <a:lnRef idx="1">
+              <a:schemeClr val="accent1"/>
+            </a:lnRef>
+            <a:fillRef idx="0">
+              <a:schemeClr val="accent1"/>
+            </a:fillRef>
+            <a:effectRef idx="0">
+              <a:schemeClr val="accent1"/>
+            </a:effectRef>
+            <a:fontRef idx="minor">
+              <a:schemeClr val="tx1"/>
+            </a:fontRef>
+          </p:style>
+        </p:cxnSp>
+        <p:cxnSp>
+          <p:nvCxnSpPr>
+            <p:cNvPr id="26" name="Straight Connector 25"/>
+            <p:cNvCxnSpPr/>
+            <p:nvPr/>
+          </p:nvCxnSpPr>
+          <p:spPr>
+            <a:xfrm>
+              <a:off x="19370452" y="6552505"/>
+              <a:ext cx="0" cy="936104"/>
+            </a:xfrm>
+            <a:prstGeom prst="line">
+              <a:avLst/>
+            </a:prstGeom>
+            <a:grpFill/>
+            <a:ln w="76200">
+              <a:solidFill>
+                <a:schemeClr val="tx2">
+                  <a:lumMod val="75000"/>
+                </a:schemeClr>
+              </a:solidFill>
+            </a:ln>
+          </p:spPr>
+          <p:style>
+            <a:lnRef idx="1">
+              <a:schemeClr val="accent1"/>
+            </a:lnRef>
+            <a:fillRef idx="0">
+              <a:schemeClr val="accent1"/>
+            </a:fillRef>
+            <a:effectRef idx="0">
+              <a:schemeClr val="accent1"/>
+            </a:effectRef>
+            <a:fontRef idx="minor">
+              <a:schemeClr val="tx1"/>
+            </a:fontRef>
+          </p:style>
+        </p:cxnSp>
+      </p:grpSp>
+      <p:sp>
+        <p:nvSpPr>
+          <p:cNvPr id="27" name="TextBox 26"/>
+          <p:cNvSpPr txBox="1"/>
+          <p:nvPr/>
+        </p:nvSpPr>
+        <p:spPr>
+          <a:xfrm>
+            <a:off x="13848078" y="9087773"/>
+            <a:ext cx="6408712" cy="830997"/>
+          </a:xfrm>
+          <a:prstGeom prst="rect">
+            <a:avLst/>
+          </a:prstGeom>
+          <a:noFill/>
+        </p:spPr>
+        <p:txBody>
+          <a:bodyPr wrap="square" rtlCol="0">
+            <a:spAutoFit/>
+          </a:bodyPr>
+          <a:lstStyle/>
+          <a:p>
+            <a:r>
+              <a:rPr lang="en-US" sz="4800" dirty="0" smtClean="0">
+                <a:solidFill>
+                  <a:schemeClr val="tx1">
+                    <a:lumMod val="95000"/>
+                    <a:lumOff val="5000"/>
+                  </a:schemeClr>
+                </a:solidFill>
+              </a:rPr>
+              <a:t>Stairs</a:t>
+            </a:r>
+            <a:endParaRPr lang="en-US" sz="4800" dirty="0">
+              <a:solidFill>
+                <a:schemeClr val="tx1">
+                  <a:lumMod val="95000"/>
+                  <a:lumOff val="5000"/>
+                </a:schemeClr>
+              </a:solidFill>
+            </a:endParaRPr>
+          </a:p>
+        </p:txBody>
+      </p:sp>
+      <p:pic>
+        <p:nvPicPr>
+          <p:cNvPr id="28" name="Picture 27"/>
+          <p:cNvPicPr>
+            <a:picLocks noChangeAspect="1"/>
+          </p:cNvPicPr>
+          <p:nvPr/>
+        </p:nvPicPr>
+        <p:blipFill>
+          <a:blip r:embed="rId2">
+            <a:extLst>
+              <a:ext uri="{28A0092B-C50C-407E-A947-70E740481C1C}">
+                <a14:useLocalDpi xmlns:a14="http://schemas.microsoft.com/office/drawing/2010/main" val="0"/>
+              </a:ext>
+            </a:extLst>
+          </a:blip>
+          <a:stretch>
+            <a:fillRect/>
+          </a:stretch>
+        </p:blipFill>
+        <p:spPr>
+          <a:xfrm>
+            <a:off x="12692457" y="10498070"/>
+            <a:ext cx="914400" cy="914400"/>
+          </a:xfrm>
+          <a:prstGeom prst="rect">
+            <a:avLst/>
+          </a:prstGeom>
+        </p:spPr>
+      </p:pic>
+      <p:sp>
+        <p:nvSpPr>
+          <p:cNvPr id="29" name="TextBox 28"/>
+          <p:cNvSpPr txBox="1"/>
+          <p:nvPr/>
+        </p:nvSpPr>
+        <p:spPr>
+          <a:xfrm>
+            <a:off x="13863081" y="10509299"/>
+            <a:ext cx="6408712" cy="830997"/>
+          </a:xfrm>
+          <a:prstGeom prst="rect">
+            <a:avLst/>
+          </a:prstGeom>
+          <a:noFill/>
+        </p:spPr>
+        <p:txBody>
+          <a:bodyPr wrap="square" rtlCol="0">
+            <a:spAutoFit/>
+          </a:bodyPr>
+          <a:lstStyle/>
+          <a:p>
+            <a:r>
+              <a:rPr lang="en-US" sz="4800" dirty="0" smtClean="0">
+                <a:solidFill>
+                  <a:schemeClr val="tx1">
+                    <a:lumMod val="95000"/>
+                    <a:lumOff val="5000"/>
+                  </a:schemeClr>
+                </a:solidFill>
+              </a:rPr>
+              <a:t>Door</a:t>
+            </a:r>
+            <a:endParaRPr lang="en-US" sz="4800" dirty="0">
+              <a:solidFill>
+                <a:schemeClr val="tx1">
+                  <a:lumMod val="95000"/>
+                  <a:lumOff val="5000"/>
+                </a:schemeClr>
+              </a:solidFill>
+            </a:endParaRPr>
+          </a:p>
+        </p:txBody>
+      </p:sp>
+      <p:sp>
+        <p:nvSpPr>
+          <p:cNvPr id="30" name="TextBox 29"/>
+          <p:cNvSpPr txBox="1"/>
+          <p:nvPr/>
+        </p:nvSpPr>
+        <p:spPr>
+          <a:xfrm>
+            <a:off x="16924964" y="1563773"/>
+            <a:ext cx="6408712" cy="830997"/>
+          </a:xfrm>
+          <a:prstGeom prst="rect">
+            <a:avLst/>
+          </a:prstGeom>
+          <a:noFill/>
+        </p:spPr>
+        <p:txBody>
+          <a:bodyPr wrap="square" rtlCol="0">
+            <a:spAutoFit/>
+          </a:bodyPr>
+          <a:lstStyle/>
+          <a:p>
+            <a:r>
+              <a:rPr lang="en-US" sz="4800" dirty="0" smtClean="0">
+                <a:solidFill>
+                  <a:schemeClr val="tx1">
+                    <a:lumMod val="95000"/>
+                    <a:lumOff val="5000"/>
+                  </a:schemeClr>
+                </a:solidFill>
+              </a:rPr>
+              <a:t>LEGENDS:</a:t>
+            </a:r>
+            <a:endParaRPr lang="en-US" sz="4800" dirty="0">
+              <a:solidFill>
+                <a:schemeClr val="tx1">
+                  <a:lumMod val="95000"/>
+                  <a:lumOff val="5000"/>
+                </a:schemeClr>
               </a:solidFill>
             </a:endParaRPr>
           </a:p>
@@ -7698,10 +8539,7 @@
             <a:avLst/>
           </a:prstGeom>
           <a:solidFill>
-            <a:schemeClr val="accent6">
-              <a:lumMod val="40000"/>
-              <a:lumOff val="60000"/>
-            </a:schemeClr>
+            <a:srgbClr val="00B0F0"/>
           </a:solidFill>
           <a:ln w="76200"/>
         </p:spPr>
@@ -8857,10 +9695,7 @@
             <a:avLst/>
           </a:prstGeom>
           <a:solidFill>
-            <a:schemeClr val="accent3">
-              <a:lumMod val="40000"/>
-              <a:lumOff val="60000"/>
-            </a:schemeClr>
+            <a:srgbClr val="F8FC42"/>
           </a:solidFill>
           <a:ln w="76200"/>
         </p:spPr>
@@ -12984,10 +13819,7 @@
             <a:avLst/>
           </a:prstGeom>
           <a:solidFill>
-            <a:schemeClr val="accent3">
-              <a:lumMod val="40000"/>
-              <a:lumOff val="60000"/>
-            </a:schemeClr>
+            <a:srgbClr val="F8FC42"/>
           </a:solidFill>
           <a:ln w="76200"/>
         </p:spPr>
@@ -13414,10 +14246,7 @@
             <a:avLst/>
           </a:prstGeom>
           <a:solidFill>
-            <a:schemeClr val="accent6">
-              <a:lumMod val="40000"/>
-              <a:lumOff val="60000"/>
-            </a:schemeClr>
+            <a:srgbClr val="00B0F0"/>
           </a:solidFill>
           <a:ln w="76200"/>
         </p:spPr>
@@ -14573,10 +15402,7 @@
             <a:avLst/>
           </a:prstGeom>
           <a:solidFill>
-            <a:schemeClr val="accent3">
-              <a:lumMod val="40000"/>
-              <a:lumOff val="60000"/>
-            </a:schemeClr>
+            <a:srgbClr val="F8FC42"/>
           </a:solidFill>
           <a:ln w="76200"/>
         </p:spPr>
@@ -17780,10 +18606,7 @@
             <a:avLst/>
           </a:prstGeom>
           <a:solidFill>
-            <a:schemeClr val="accent3">
-              <a:lumMod val="40000"/>
-              <a:lumOff val="60000"/>
-            </a:schemeClr>
+            <a:srgbClr val="F8FC42"/>
           </a:solidFill>
           <a:ln w="76200"/>
         </p:spPr>
@@ -19883,7 +20706,7 @@
         </p:nvSpPr>
         <p:spPr>
           <a:xfrm>
-            <a:off x="40468795" y="518067"/>
+            <a:off x="40515295" y="620967"/>
             <a:ext cx="1296144" cy="7416824"/>
           </a:xfrm>
           <a:prstGeom prst="rect">
@@ -19926,7 +20749,7 @@
         </p:nvSpPr>
         <p:spPr>
           <a:xfrm>
-            <a:off x="45588" y="531114"/>
+            <a:off x="35213" y="628409"/>
             <a:ext cx="1296144" cy="7416824"/>
           </a:xfrm>
           <a:prstGeom prst="rect">
@@ -19969,8 +20792,8 @@
         </p:nvSpPr>
         <p:spPr>
           <a:xfrm>
-            <a:off x="38925" y="6579786"/>
-            <a:ext cx="2835709" cy="1368152"/>
+            <a:off x="57559" y="6579785"/>
+            <a:ext cx="2852901" cy="1465447"/>
           </a:xfrm>
           <a:prstGeom prst="rect">
             <a:avLst/>
@@ -20012,7 +20835,7 @@
         </p:nvSpPr>
         <p:spPr>
           <a:xfrm>
-            <a:off x="39206817" y="6644865"/>
+            <a:off x="39279444" y="6745642"/>
             <a:ext cx="2414108" cy="1290026"/>
           </a:xfrm>
           <a:prstGeom prst="rect">
@@ -20055,12 +20878,17 @@
         </p:nvSpPr>
         <p:spPr>
           <a:xfrm>
-            <a:off x="1095724" y="531114"/>
-            <a:ext cx="1784896" cy="6138127"/>
+            <a:off x="1269398" y="636520"/>
+            <a:ext cx="1641061" cy="6138127"/>
           </a:xfrm>
           <a:prstGeom prst="rect">
             <a:avLst/>
           </a:prstGeom>
+          <a:ln>
+            <a:solidFill>
+              <a:schemeClr val="tx1"/>
+            </a:solidFill>
+          </a:ln>
         </p:spPr>
         <p:style>
           <a:lnRef idx="2">
@@ -20095,12 +20923,17 @@
         </p:nvSpPr>
         <p:spPr>
           <a:xfrm>
-            <a:off x="39233032" y="518067"/>
-            <a:ext cx="1784896" cy="6138127"/>
+            <a:off x="39290852" y="585137"/>
+            <a:ext cx="1321960" cy="6138127"/>
           </a:xfrm>
           <a:prstGeom prst="rect">
             <a:avLst/>
           </a:prstGeom>
+          <a:ln>
+            <a:solidFill>
+              <a:schemeClr val="tx1"/>
+            </a:solidFill>
+          </a:ln>
         </p:spPr>
         <p:style>
           <a:lnRef idx="2">
@@ -20135,7 +20968,7 @@
         </p:nvGrpSpPr>
         <p:grpSpPr>
           <a:xfrm>
-            <a:off x="26886708" y="501290"/>
+            <a:off x="26715268" y="870689"/>
             <a:ext cx="548640" cy="3017520"/>
             <a:chOff x="25275108" y="1009135"/>
             <a:chExt cx="634254" cy="4248000"/>
@@ -20230,7 +21063,7 @@
         </p:nvGrpSpPr>
         <p:grpSpPr>
           <a:xfrm>
-            <a:off x="26166628" y="501290"/>
+            <a:off x="25995188" y="870689"/>
             <a:ext cx="548640" cy="3017520"/>
             <a:chOff x="25275108" y="1009135"/>
             <a:chExt cx="634254" cy="4248000"/>
@@ -20325,7 +21158,7 @@
         </p:nvGrpSpPr>
         <p:grpSpPr>
           <a:xfrm>
-            <a:off x="24726468" y="501290"/>
+            <a:off x="24555028" y="870689"/>
             <a:ext cx="548640" cy="3017520"/>
             <a:chOff x="25275108" y="1009135"/>
             <a:chExt cx="634254" cy="4248000"/>
@@ -20420,7 +21253,7 @@
         </p:nvGrpSpPr>
         <p:grpSpPr>
           <a:xfrm>
-            <a:off x="25446548" y="501290"/>
+            <a:off x="25275108" y="870689"/>
             <a:ext cx="548640" cy="3017520"/>
             <a:chOff x="25275108" y="1009135"/>
             <a:chExt cx="634254" cy="4248000"/>
@@ -20515,7 +21348,7 @@
         </p:nvGrpSpPr>
         <p:grpSpPr>
           <a:xfrm>
-            <a:off x="27626220" y="479331"/>
+            <a:off x="27454599" y="885991"/>
             <a:ext cx="548640" cy="3017520"/>
             <a:chOff x="25275108" y="1009135"/>
             <a:chExt cx="634254" cy="4248000"/>
@@ -21077,47 +21910,6 @@
           </p:txBody>
         </p:sp>
       </p:grpSp>
-      <p:sp>
-        <p:nvSpPr>
-          <p:cNvPr id="70" name="Rectangle 69"/>
-          <p:cNvSpPr/>
-          <p:nvPr/>
-        </p:nvSpPr>
-        <p:spPr>
-          <a:xfrm>
-            <a:off x="34987727" y="3928816"/>
-            <a:ext cx="4136926" cy="1903609"/>
-          </a:xfrm>
-          <a:prstGeom prst="rect">
-            <a:avLst/>
-          </a:prstGeom>
-          <a:ln/>
-        </p:spPr>
-        <p:style>
-          <a:lnRef idx="2">
-            <a:schemeClr val="accent3">
-              <a:shade val="50000"/>
-            </a:schemeClr>
-          </a:lnRef>
-          <a:fillRef idx="1">
-            <a:schemeClr val="accent3"/>
-          </a:fillRef>
-          <a:effectRef idx="0">
-            <a:schemeClr val="accent3"/>
-          </a:effectRef>
-          <a:fontRef idx="minor">
-            <a:schemeClr val="lt1"/>
-          </a:fontRef>
-        </p:style>
-        <p:txBody>
-          <a:bodyPr rtlCol="0" anchor="ctr"/>
-          <a:lstStyle/>
-          <a:p>
-            <a:pPr algn="ctr"/>
-            <a:endParaRPr lang="en-PH"/>
-          </a:p>
-        </p:txBody>
-      </p:sp>
       <p:grpSp>
         <p:nvGrpSpPr>
           <p:cNvPr id="71" name="Group 70"/>
@@ -21316,7 +22108,7 @@
         </p:nvSpPr>
         <p:spPr>
           <a:xfrm>
-            <a:off x="38870355" y="1823953"/>
+            <a:off x="38906485" y="1240827"/>
             <a:ext cx="280265" cy="2103120"/>
           </a:xfrm>
           <a:prstGeom prst="rect">
@@ -21356,7 +22148,7 @@
         </p:nvSpPr>
         <p:spPr>
           <a:xfrm>
-            <a:off x="38870354" y="3178698"/>
+            <a:off x="38906485" y="3288441"/>
             <a:ext cx="280265" cy="731520"/>
           </a:xfrm>
           <a:prstGeom prst="rect">
@@ -21396,23 +22188,18 @@
         </p:nvSpPr>
         <p:spPr>
           <a:xfrm>
-            <a:off x="28248144" y="545117"/>
+            <a:off x="28248144" y="689133"/>
             <a:ext cx="3032720" cy="5287308"/>
           </a:xfrm>
           <a:prstGeom prst="rect">
             <a:avLst/>
           </a:prstGeom>
           <a:solidFill>
-            <a:schemeClr val="accent3">
-              <a:lumMod val="40000"/>
-              <a:lumOff val="60000"/>
-            </a:schemeClr>
+            <a:srgbClr val="F8FC42"/>
           </a:solidFill>
           <a:ln w="76200">
             <a:solidFill>
-              <a:schemeClr val="accent3">
-                <a:lumMod val="75000"/>
-              </a:schemeClr>
+              <a:srgbClr val="0070C0"/>
             </a:solidFill>
           </a:ln>
         </p:spPr>
@@ -21449,23 +22236,18 @@
         </p:nvSpPr>
         <p:spPr>
           <a:xfrm>
-            <a:off x="25174064" y="7736035"/>
+            <a:off x="25174064" y="7808043"/>
             <a:ext cx="3074080" cy="5657230"/>
           </a:xfrm>
           <a:prstGeom prst="rect">
             <a:avLst/>
           </a:prstGeom>
           <a:solidFill>
-            <a:schemeClr val="accent6">
-              <a:lumMod val="40000"/>
-              <a:lumOff val="60000"/>
-            </a:schemeClr>
+            <a:srgbClr val="00B0F0"/>
           </a:solidFill>
-          <a:ln w="76200">
+          <a:ln w="57150">
             <a:solidFill>
-              <a:schemeClr val="accent6">
-                <a:lumMod val="75000"/>
-              </a:schemeClr>
+              <a:srgbClr val="0070C0"/>
             </a:solidFill>
           </a:ln>
         </p:spPr>
@@ -21692,25 +22474,31 @@
         </p:nvSpPr>
         <p:spPr>
           <a:xfrm>
-            <a:off x="2931887" y="7794588"/>
-            <a:ext cx="18310774" cy="5540123"/>
+            <a:off x="2960012" y="7925150"/>
+            <a:ext cx="18138559" cy="5540123"/>
           </a:xfrm>
           <a:prstGeom prst="rect">
             <a:avLst/>
           </a:prstGeom>
-          <a:ln/>
+          <a:ln>
+            <a:solidFill>
+              <a:schemeClr val="accent5">
+                <a:lumMod val="50000"/>
+              </a:schemeClr>
+            </a:solidFill>
+          </a:ln>
         </p:spPr>
         <p:style>
           <a:lnRef idx="2">
-            <a:schemeClr val="accent4">
+            <a:schemeClr val="accent5">
               <a:shade val="50000"/>
             </a:schemeClr>
           </a:lnRef>
           <a:fillRef idx="1">
-            <a:schemeClr val="accent4"/>
+            <a:schemeClr val="accent5"/>
           </a:fillRef>
           <a:effectRef idx="0">
-            <a:schemeClr val="accent4"/>
+            <a:schemeClr val="accent5"/>
           </a:effectRef>
           <a:fontRef idx="minor">
             <a:schemeClr val="lt1"/>
@@ -21740,24 +22528,25 @@
             <a:avLst/>
           </a:prstGeom>
           <a:solidFill>
-            <a:schemeClr val="accent3">
-              <a:lumMod val="40000"/>
-              <a:lumOff val="60000"/>
-            </a:schemeClr>
+            <a:srgbClr val="F8FC42"/>
           </a:solidFill>
-          <a:ln w="76200"/>
+          <a:ln w="57150">
+            <a:solidFill>
+              <a:srgbClr val="0070C0"/>
+            </a:solidFill>
+          </a:ln>
         </p:spPr>
         <p:style>
           <a:lnRef idx="2">
-            <a:schemeClr val="accent1">
+            <a:schemeClr val="accent6">
               <a:shade val="50000"/>
             </a:schemeClr>
           </a:lnRef>
           <a:fillRef idx="1">
-            <a:schemeClr val="accent1"/>
+            <a:schemeClr val="accent6"/>
           </a:fillRef>
           <a:effectRef idx="0">
-            <a:schemeClr val="accent1"/>
+            <a:schemeClr val="accent6"/>
           </a:effectRef>
           <a:fontRef idx="minor">
             <a:schemeClr val="lt1"/>
@@ -21824,7 +22613,7 @@
         </p:blipFill>
         <p:spPr>
           <a:xfrm>
-            <a:off x="19341787" y="18531"/>
+            <a:off x="19341787" y="105258"/>
             <a:ext cx="542591" cy="542591"/>
           </a:xfrm>
           <a:prstGeom prst="rect">
@@ -21884,7 +22673,7 @@
         </p:blipFill>
         <p:spPr>
           <a:xfrm rot="5400000" flipH="1" flipV="1">
-            <a:off x="2338029" y="6848064"/>
+            <a:off x="2410037" y="6848064"/>
             <a:ext cx="542591" cy="542591"/>
           </a:xfrm>
           <a:prstGeom prst="rect">
@@ -21914,7 +22703,7 @@
         </p:blipFill>
         <p:spPr>
           <a:xfrm rot="5400000" flipH="1" flipV="1">
-            <a:off x="2332043" y="6022068"/>
+            <a:off x="2410037" y="6022068"/>
             <a:ext cx="542591" cy="542591"/>
           </a:xfrm>
           <a:prstGeom prst="rect">
@@ -21944,7 +22733,7 @@
         </p:blipFill>
         <p:spPr>
           <a:xfrm rot="5400000" flipH="1">
-            <a:off x="39233032" y="7065799"/>
+            <a:off x="39257327" y="7187298"/>
             <a:ext cx="542591" cy="542591"/>
           </a:xfrm>
           <a:prstGeom prst="rect">
@@ -21974,7 +22763,7 @@
         </p:blipFill>
         <p:spPr>
           <a:xfrm rot="5400000" flipH="1">
-            <a:off x="39233032" y="5985623"/>
+            <a:off x="39297759" y="6105652"/>
             <a:ext cx="542591" cy="542591"/>
           </a:xfrm>
           <a:prstGeom prst="rect">
@@ -22535,7 +23324,7 @@
   <a:extraClrSchemeLst/>
   <a:extLst>
     <a:ext uri="{05A4C25C-085E-4340-85A3-A5531E510DB2}">
-      <thm15:themeFamily xmlns="" xmlns:thm15="http://schemas.microsoft.com/office/thememl/2012/main" name="Office Theme" id="{62F939B6-93AF-4DB8-9C6B-D6C7DFDC589F}" vid="{4A3C46E8-61CC-4603-A589-7422A47A8E4A}"/>
+      <thm15:themeFamily xmlns:thm15="http://schemas.microsoft.com/office/thememl/2012/main" name="Office Theme" id="{62F939B6-93AF-4DB8-9C6B-D6C7DFDC589F}" vid="{4A3C46E8-61CC-4603-A589-7422A47A8E4A}"/>
     </a:ext>
   </a:extLst>
 </a:theme>

</xml_diff>